<commit_message>
Added movie collection task.
</commit_message>
<xml_diff>
--- a/React.pptx
+++ b/React.pptx
@@ -6036,25 +6036,6 @@
           </a:p>
         </p:txBody>
       </p:sp>
-      <p:sp>
-        <p:nvSpPr>
-          <p:cNvPr id="3" name="Объект 2"/>
-          <p:cNvSpPr>
-            <a:spLocks noGrp="1"/>
-          </p:cNvSpPr>
-          <p:nvPr>
-            <p:ph idx="1"/>
-          </p:nvPr>
-        </p:nvSpPr>
-        <p:spPr/>
-        <p:txBody>
-          <a:bodyPr/>
-          <a:lstStyle/>
-          <a:p>
-            <a:endParaRPr lang="ru-RU"/>
-          </a:p>
-        </p:txBody>
-      </p:sp>
     </p:spTree>
     <p:extLst>
       <p:ext uri="{BB962C8B-B14F-4D97-AF65-F5344CB8AC3E}">
@@ -6124,12 +6105,27 @@
           <a:lstStyle/>
           <a:p>
             <a:r>
+              <a:rPr lang="ru-RU" dirty="0"/>
+              <a:t>Логика приложения – </a:t>
+            </a:r>
+            <a:r>
+              <a:rPr lang="en-US" dirty="0"/>
+              <a:t>Redux</a:t>
+            </a:r>
+            <a:endParaRPr lang="ru-RU" dirty="0"/>
+          </a:p>
+          <a:p>
+            <a:r>
               <a:rPr lang="ru-RU" dirty="0" err="1" smtClean="0"/>
               <a:t>Роутинг</a:t>
             </a:r>
             <a:r>
               <a:rPr lang="ru-RU" dirty="0" smtClean="0"/>
-              <a:t> – </a:t>
+              <a:t> </a:t>
+            </a:r>
+            <a:r>
+              <a:rPr lang="ru-RU" dirty="0" smtClean="0"/>
+              <a:t>– </a:t>
             </a:r>
             <a:r>
               <a:rPr lang="en-US" dirty="0" smtClean="0"/>
@@ -6144,20 +6140,13 @@
             </a:r>
             <a:r>
               <a:rPr lang="en-US" dirty="0" smtClean="0"/>
-              <a:t>React Final Form</a:t>
+              <a:t>React Final </a:t>
+            </a:r>
+            <a:r>
+              <a:rPr lang="en-US" dirty="0" smtClean="0"/>
+              <a:t>Form</a:t>
             </a:r>
             <a:endParaRPr lang="ru-RU" dirty="0" smtClean="0"/>
-          </a:p>
-          <a:p>
-            <a:r>
-              <a:rPr lang="ru-RU" dirty="0" smtClean="0"/>
-              <a:t>Логика приложения – </a:t>
-            </a:r>
-            <a:r>
-              <a:rPr lang="en-US" dirty="0" smtClean="0"/>
-              <a:t>Redux</a:t>
-            </a:r>
-            <a:endParaRPr lang="ru-RU" dirty="0"/>
           </a:p>
         </p:txBody>
       </p:sp>
@@ -6236,12 +6225,41 @@
           </a:p>
           <a:p>
             <a:r>
-              <a:rPr lang="en-US" dirty="0" smtClean="0"/>
+              <a:rPr lang="en-US" dirty="0" smtClean="0">
+                <a:hlinkClick r:id="rId2"/>
+              </a:rPr>
               <a:t>https</a:t>
             </a:r>
             <a:r>
-              <a:rPr lang="en-US" dirty="0"/>
-              <a:t>://www.freecodecamp.org/learn/front-end-development-libraries/</a:t>
+              <a:rPr lang="en-US" dirty="0">
+                <a:hlinkClick r:id="rId2"/>
+              </a:rPr>
+              <a:t>://www.freecodecamp.org/learn/front-end-development-libraries</a:t>
+            </a:r>
+            <a:r>
+              <a:rPr lang="en-US" dirty="0" smtClean="0">
+                <a:hlinkClick r:id="rId2"/>
+              </a:rPr>
+              <a:t>/</a:t>
+            </a:r>
+            <a:endParaRPr lang="ru-RU" dirty="0" smtClean="0"/>
+          </a:p>
+          <a:p>
+            <a:r>
+              <a:rPr lang="en-US" dirty="0">
+                <a:hlinkClick r:id="rId3"/>
+              </a:rPr>
+              <a:t>https://</a:t>
+            </a:r>
+            <a:r>
+              <a:rPr lang="en-US" dirty="0" smtClean="0">
+                <a:hlinkClick r:id="rId3"/>
+              </a:rPr>
+              <a:t>github.com/MichailOsipov/React-students</a:t>
+            </a:r>
+            <a:r>
+              <a:rPr lang="ru-RU" dirty="0" smtClean="0"/>
+              <a:t> - материалы</a:t>
             </a:r>
             <a:endParaRPr lang="ru-RU" dirty="0"/>
           </a:p>

</xml_diff>